<commit_message>
updated for devlink intro slide
</commit_message>
<xml_diff>
--- a/Presentations/CustomerDNA/CustomerDNA.pptx
+++ b/Presentations/CustomerDNA/CustomerDNA.pptx
@@ -8836,7 +8836,6 @@
               <a:rPr lang="en-US" smtClean="0"/>
               <a:t>Click to edit Master title style</a:t>
             </a:r>
-            <a:endParaRPr lang="en-US" smtClean="0"/>
           </a:p>
         </p:txBody>
       </p:sp>
@@ -8923,7 +8922,6 @@
               <a:rPr lang="en-US" smtClean="0"/>
               <a:t>Fifth level</a:t>
             </a:r>
-            <a:endParaRPr lang="en-US" smtClean="0"/>
           </a:p>
         </p:txBody>
       </p:sp>
@@ -10331,7 +10329,7 @@
         </p:spPr>
         <p:txBody>
           <a:bodyPr rtlCol="0">
-            <a:normAutofit/>
+            <a:noAutofit/>
           </a:bodyPr>
           <a:lstStyle/>
           <a:p>
@@ -10345,7 +10343,53 @@
               <a:rPr lang="en-US" sz="3200" dirty="0" smtClean="0">
                 <a:ea typeface="+mn-ea"/>
               </a:rPr>
-              <a:t>Michael C. Neel</a:t>
+              <a:t>Michael </a:t>
+            </a:r>
+            <a:r>
+              <a:rPr lang="en-US" sz="3200" dirty="0" smtClean="0">
+                <a:ea typeface="+mn-ea"/>
+              </a:rPr>
+              <a:t>C</a:t>
+            </a:r>
+            <a:r>
+              <a:rPr lang="en-US" sz="3200" dirty="0" smtClean="0">
+                <a:ea typeface="+mn-ea"/>
+              </a:rPr>
+              <a:t>. </a:t>
+            </a:r>
+            <a:r>
+              <a:rPr lang="en-US" sz="3200" dirty="0" smtClean="0">
+                <a:ea typeface="+mn-ea"/>
+              </a:rPr>
+              <a:t>Neel</a:t>
+            </a:r>
+          </a:p>
+          <a:p>
+            <a:pPr fontAlgn="auto">
+              <a:spcAft>
+                <a:spcPts val="0"/>
+              </a:spcAft>
+              <a:defRPr/>
+            </a:pPr>
+            <a:r>
+              <a:rPr lang="en-US" sz="3200" dirty="0" smtClean="0">
+                <a:ea typeface="+mn-ea"/>
+              </a:rPr>
+              <a:t>ViNull.com</a:t>
+            </a:r>
+          </a:p>
+          <a:p>
+            <a:pPr fontAlgn="auto">
+              <a:spcAft>
+                <a:spcPts val="0"/>
+              </a:spcAft>
+              <a:defRPr/>
+            </a:pPr>
+            <a:r>
+              <a:rPr lang="en-US" sz="3200" dirty="0" smtClean="0">
+                <a:ea typeface="+mn-ea"/>
+              </a:rPr>
+              <a:t>michael.neel@gmail.com</a:t>
             </a:r>
             <a:endParaRPr lang="en-US" sz="3200" dirty="0">
               <a:ea typeface="+mn-ea"/>
@@ -11407,15 +11451,7 @@
               <a:srgbClr val="C0C0C0"/>
             </a:contourClr>
           </a:sp3d>
-          <a:extLst>
-            <a:ext uri="{909E8E84-426E-40DD-AFC4-6F175D3DCCD1}">
-              <a14:hiddenFill xmlns:a14="http://schemas.microsoft.com/office/drawing/2010/main">
-                <a:solidFill>
-                  <a:srgbClr val="FFFFFF"/>
-                </a:solidFill>
-              </a14:hiddenFill>
-            </a:ext>
-          </a:extLst>
+          <a:extLst/>
         </p:spPr>
       </p:pic>
     </p:spTree>

</xml_diff>